<commit_message>
Added problem statement in the ppt, removed bankurrptices cleaning in py script
</commit_message>
<xml_diff>
--- a/EDA_Presentation.pptx
+++ b/EDA_Presentation.pptx
@@ -5,20 +5,21 @@
     <p:sldMasterId id="2147483660" r:id="rId1"/>
   </p:sldMasterIdLst>
   <p:notesMasterIdLst>
-    <p:notesMasterId r:id="rId13"/>
+    <p:notesMasterId r:id="rId14"/>
   </p:notesMasterIdLst>
   <p:sldIdLst>
     <p:sldId id="256" r:id="rId2"/>
     <p:sldId id="257" r:id="rId3"/>
-    <p:sldId id="271" r:id="rId4"/>
-    <p:sldId id="258" r:id="rId5"/>
-    <p:sldId id="259" r:id="rId6"/>
-    <p:sldId id="260" r:id="rId7"/>
-    <p:sldId id="267" r:id="rId8"/>
-    <p:sldId id="270" r:id="rId9"/>
-    <p:sldId id="262" r:id="rId10"/>
-    <p:sldId id="268" r:id="rId11"/>
-    <p:sldId id="265" r:id="rId12"/>
+    <p:sldId id="272" r:id="rId4"/>
+    <p:sldId id="271" r:id="rId5"/>
+    <p:sldId id="258" r:id="rId6"/>
+    <p:sldId id="259" r:id="rId7"/>
+    <p:sldId id="260" r:id="rId8"/>
+    <p:sldId id="267" r:id="rId9"/>
+    <p:sldId id="270" r:id="rId10"/>
+    <p:sldId id="262" r:id="rId11"/>
+    <p:sldId id="268" r:id="rId12"/>
+    <p:sldId id="265" r:id="rId13"/>
   </p:sldIdLst>
   <p:sldSz cx="12192000" cy="6858000"/>
   <p:notesSz cx="6858000" cy="9144000"/>
@@ -128,10 +129,6 @@
 </p:presentation>
 </file>
 
-<file path=ppt/revisionInfo.xml><?xml version="1.0" encoding="utf-8"?>
-<p1510:revInfo xmlns:a="http://schemas.openxmlformats.org/drawingml/2006/main" xmlns:r="http://schemas.openxmlformats.org/officeDocument/2006/relationships" xmlns:p1510="http://schemas.microsoft.com/office/powerpoint/2015/10/main"/>
-</file>
-
 <file path=ppt/notesMasters/notesMaster1.xml><?xml version="1.0" encoding="utf-8"?>
 <p:notesMaster xmlns:a="http://schemas.openxmlformats.org/drawingml/2006/main" xmlns:r="http://schemas.openxmlformats.org/officeDocument/2006/relationships" xmlns:p="http://schemas.openxmlformats.org/presentationml/2006/main">
   <p:cSld>
@@ -214,7 +211,7 @@
           <a:p>
             <a:fld id="{2E309023-AF2B-4043-B228-F191CADC9BB1}" type="datetimeFigureOut">
               <a:rPr lang="en-IN" smtClean="0"/>
-              <a:t>18-05-2018</a:t>
+              <a:t>25/05/18</a:t>
             </a:fld>
             <a:endParaRPr lang="en-IN"/>
           </a:p>
@@ -613,7 +610,7 @@
           <a:p>
             <a:fld id="{70C018FE-C8D6-4A9C-A702-41F1E0C1C452}" type="datetimeFigureOut">
               <a:rPr lang="en-IN" smtClean="0"/>
-              <a:t>18-05-2018</a:t>
+              <a:t>25/05/18</a:t>
             </a:fld>
             <a:endParaRPr lang="en-IN"/>
           </a:p>
@@ -783,7 +780,7 @@
           <a:p>
             <a:fld id="{70C018FE-C8D6-4A9C-A702-41F1E0C1C452}" type="datetimeFigureOut">
               <a:rPr lang="en-IN" smtClean="0"/>
-              <a:t>18-05-2018</a:t>
+              <a:t>25/05/18</a:t>
             </a:fld>
             <a:endParaRPr lang="en-IN"/>
           </a:p>
@@ -963,7 +960,7 @@
           <a:p>
             <a:fld id="{70C018FE-C8D6-4A9C-A702-41F1E0C1C452}" type="datetimeFigureOut">
               <a:rPr lang="en-IN" smtClean="0"/>
-              <a:t>18-05-2018</a:t>
+              <a:t>25/05/18</a:t>
             </a:fld>
             <a:endParaRPr lang="en-IN"/>
           </a:p>
@@ -1395,7 +1392,7 @@
           <a:p>
             <a:fld id="{70C018FE-C8D6-4A9C-A702-41F1E0C1C452}" type="datetimeFigureOut">
               <a:rPr lang="en-IN" smtClean="0"/>
-              <a:t>18-05-2018</a:t>
+              <a:t>25/05/18</a:t>
             </a:fld>
             <a:endParaRPr lang="en-IN"/>
           </a:p>
@@ -1627,7 +1624,7 @@
           <a:p>
             <a:fld id="{70C018FE-C8D6-4A9C-A702-41F1E0C1C452}" type="datetimeFigureOut">
               <a:rPr lang="en-IN" smtClean="0"/>
-              <a:t>18-05-2018</a:t>
+              <a:t>25/05/18</a:t>
             </a:fld>
             <a:endParaRPr lang="en-IN"/>
           </a:p>
@@ -1994,7 +1991,7 @@
           <a:p>
             <a:fld id="{70C018FE-C8D6-4A9C-A702-41F1E0C1C452}" type="datetimeFigureOut">
               <a:rPr lang="en-IN" smtClean="0"/>
-              <a:t>18-05-2018</a:t>
+              <a:t>25/05/18</a:t>
             </a:fld>
             <a:endParaRPr lang="en-IN"/>
           </a:p>
@@ -2112,7 +2109,7 @@
           <a:p>
             <a:fld id="{70C018FE-C8D6-4A9C-A702-41F1E0C1C452}" type="datetimeFigureOut">
               <a:rPr lang="en-IN" smtClean="0"/>
-              <a:t>18-05-2018</a:t>
+              <a:t>25/05/18</a:t>
             </a:fld>
             <a:endParaRPr lang="en-IN"/>
           </a:p>
@@ -2207,7 +2204,7 @@
           <a:p>
             <a:fld id="{70C018FE-C8D6-4A9C-A702-41F1E0C1C452}" type="datetimeFigureOut">
               <a:rPr lang="en-IN" smtClean="0"/>
-              <a:t>18-05-2018</a:t>
+              <a:t>25/05/18</a:t>
             </a:fld>
             <a:endParaRPr lang="en-IN"/>
           </a:p>
@@ -2483,7 +2480,7 @@
           <a:p>
             <a:fld id="{70C018FE-C8D6-4A9C-A702-41F1E0C1C452}" type="datetimeFigureOut">
               <a:rPr lang="en-IN" smtClean="0"/>
-              <a:t>18-05-2018</a:t>
+              <a:t>25/05/18</a:t>
             </a:fld>
             <a:endParaRPr lang="en-IN"/>
           </a:p>
@@ -2740,7 +2737,7 @@
           <a:p>
             <a:fld id="{70C018FE-C8D6-4A9C-A702-41F1E0C1C452}" type="datetimeFigureOut">
               <a:rPr lang="en-IN" smtClean="0"/>
-              <a:t>18-05-2018</a:t>
+              <a:t>25/05/18</a:t>
             </a:fld>
             <a:endParaRPr lang="en-IN"/>
           </a:p>
@@ -2951,7 +2948,7 @@
           <a:p>
             <a:fld id="{70C018FE-C8D6-4A9C-A702-41F1E0C1C452}" type="datetimeFigureOut">
               <a:rPr lang="en-IN" smtClean="0"/>
-              <a:t>18-05-2018</a:t>
+              <a:t>25/05/18</a:t>
             </a:fld>
             <a:endParaRPr lang="en-IN" dirty="0"/>
           </a:p>
@@ -3631,6 +3628,94 @@
             </a:pPr>
             <a:r>
               <a:rPr lang="en-IN" sz="1800" dirty="0"/>
+              <a:t>Plot 1 – Univariate and Segmented Univariate Analysis </a:t>
+            </a:r>
+          </a:p>
+        </p:txBody>
+      </p:sp>
+      <p:sp>
+        <p:nvSpPr>
+          <p:cNvPr id="6" name="Title 1"/>
+          <p:cNvSpPr>
+            <a:spLocks noGrp="1"/>
+          </p:cNvSpPr>
+          <p:nvPr>
+            <p:ph type="title"/>
+          </p:nvPr>
+        </p:nvSpPr>
+        <p:spPr>
+          <a:xfrm>
+            <a:off x="1136469" y="640080"/>
+            <a:ext cx="9313817" cy="856138"/>
+          </a:xfrm>
+        </p:spPr>
+        <p:txBody>
+          <a:bodyPr/>
+          <a:lstStyle/>
+          <a:p>
+            <a:r>
+              <a:rPr lang="en-IN" b="1" dirty="0"/>
+              <a:t> </a:t>
+            </a:r>
+            <a:r>
+              <a:rPr lang="en-IN" sz="2800" dirty="0"/>
+              <a:t>&lt;Results&gt;</a:t>
+            </a:r>
+          </a:p>
+        </p:txBody>
+      </p:sp>
+    </p:spTree>
+    <p:extLst>
+      <p:ext uri="{BB962C8B-B14F-4D97-AF65-F5344CB8AC3E}">
+        <p14:creationId xmlns:p14="http://schemas.microsoft.com/office/powerpoint/2010/main" val="1739856806"/>
+      </p:ext>
+    </p:extLst>
+  </p:cSld>
+  <p:clrMapOvr>
+    <a:masterClrMapping/>
+  </p:clrMapOvr>
+</p:sld>
+</file>
+
+<file path=ppt/slides/slide11.xml><?xml version="1.0" encoding="utf-8"?>
+<p:sld xmlns:a="http://schemas.openxmlformats.org/drawingml/2006/main" xmlns:r="http://schemas.openxmlformats.org/officeDocument/2006/relationships" xmlns:p="http://schemas.openxmlformats.org/presentationml/2006/main">
+  <p:cSld>
+    <p:spTree>
+      <p:nvGrpSpPr>
+        <p:cNvPr id="1" name=""/>
+        <p:cNvGrpSpPr/>
+        <p:nvPr/>
+      </p:nvGrpSpPr>
+      <p:grpSpPr>
+        <a:xfrm>
+          <a:off x="0" y="0"/>
+          <a:ext cx="0" cy="0"/>
+          <a:chOff x="0" y="0"/>
+          <a:chExt cx="0" cy="0"/>
+        </a:xfrm>
+      </p:grpSpPr>
+      <p:sp>
+        <p:nvSpPr>
+          <p:cNvPr id="3" name="Content Placeholder 2"/>
+          <p:cNvSpPr>
+            <a:spLocks noGrp="1"/>
+          </p:cNvSpPr>
+          <p:nvPr>
+            <p:ph idx="1"/>
+          </p:nvPr>
+        </p:nvSpPr>
+        <p:spPr/>
+        <p:txBody>
+          <a:bodyPr>
+            <a:normAutofit/>
+          </a:bodyPr>
+          <a:lstStyle/>
+          <a:p>
+            <a:pPr marL="0" indent="0">
+              <a:buNone/>
+            </a:pPr>
+            <a:r>
+              <a:rPr lang="en-IN" sz="1800" dirty="0"/>
               <a:t>Plot 2 – Bivariate Analysis</a:t>
             </a:r>
           </a:p>
@@ -3680,7 +3765,7 @@
 </p:sld>
 </file>
 
-<file path=ppt/slides/slide11.xml><?xml version="1.0" encoding="utf-8"?>
+<file path=ppt/slides/slide12.xml><?xml version="1.0" encoding="utf-8"?>
 <p:sld xmlns:a="http://schemas.openxmlformats.org/drawingml/2006/main" xmlns:r="http://schemas.openxmlformats.org/officeDocument/2006/relationships" xmlns:p="http://schemas.openxmlformats.org/presentationml/2006/main">
   <p:cSld>
     <p:spTree>
@@ -3795,14 +3880,232 @@
         <p:spPr/>
         <p:txBody>
           <a:bodyPr>
-            <a:normAutofit/>
+            <a:normAutofit fontScale="77500" lnSpcReduction="20000"/>
           </a:bodyPr>
           <a:lstStyle/>
           <a:p>
             <a:pPr marL="342900" indent="-342900">
               <a:buAutoNum type="arabicPeriod"/>
             </a:pPr>
-            <a:endParaRPr lang="en-IN" sz="1400" dirty="0"/>
+            <a:r>
+              <a:rPr lang="en-CA" sz="2300" dirty="0">
+                <a:latin typeface="+mn-lt"/>
+              </a:rPr>
+              <a:t>Given data contains the information about past loan applicants and whether they ‘defaulted’ or not.</a:t>
+            </a:r>
+            <a:endParaRPr lang="en-US" sz="2300" dirty="0">
+              <a:latin typeface="+mn-lt"/>
+            </a:endParaRPr>
+          </a:p>
+          <a:p>
+            <a:pPr marL="342900" indent="-342900">
+              <a:buAutoNum type="arabicPeriod"/>
+            </a:pPr>
+            <a:r>
+              <a:rPr lang="en-US" sz="2300" dirty="0">
+                <a:latin typeface="+mn-lt"/>
+              </a:rPr>
+              <a:t>Identify </a:t>
+            </a:r>
+            <a:r>
+              <a:rPr lang="en-CA" sz="2300" dirty="0">
+                <a:latin typeface="+mn-lt"/>
+              </a:rPr>
+              <a:t>patterns which indicate if a person is likely to default, which may be used for taking actions such as denying the loan, reducing the amount of loan, lending (to risky applicants) at a higher interest rate, etc.</a:t>
+            </a:r>
+          </a:p>
+          <a:p>
+            <a:pPr marL="342900" indent="-342900">
+              <a:buAutoNum type="arabicPeriod"/>
+            </a:pPr>
+            <a:r>
+              <a:rPr lang="en-CA" sz="2300" dirty="0">
+                <a:latin typeface="+mn-lt"/>
+              </a:rPr>
+              <a:t>Should not land in a ‘loss of business’ at the same time to avoid ‘financial loss’.</a:t>
+            </a:r>
+          </a:p>
+          <a:p>
+            <a:pPr marL="342900" indent="-342900">
+              <a:buAutoNum type="arabicPeriod"/>
+            </a:pPr>
+            <a:r>
+              <a:rPr lang="en-CA" sz="2300" dirty="0">
+                <a:latin typeface="+mn-lt"/>
+              </a:rPr>
+              <a:t>EDA to be used</a:t>
+            </a:r>
+          </a:p>
+          <a:p>
+            <a:pPr marL="342900" indent="-342900">
+              <a:buAutoNum type="arabicPeriod"/>
+            </a:pPr>
+            <a:r>
+              <a:rPr lang="en-CA" sz="2300" dirty="0">
+                <a:latin typeface="+mn-lt"/>
+              </a:rPr>
+              <a:t>Understand how </a:t>
+            </a:r>
+            <a:r>
+              <a:rPr lang="en-CA" sz="2300" b="1" dirty="0">
+                <a:latin typeface="+mn-lt"/>
+              </a:rPr>
+              <a:t>consumer attributes</a:t>
+            </a:r>
+            <a:r>
+              <a:rPr lang="en-CA" sz="2300" dirty="0">
+                <a:latin typeface="+mn-lt"/>
+              </a:rPr>
+              <a:t> and </a:t>
+            </a:r>
+            <a:r>
+              <a:rPr lang="en-CA" sz="2300" b="1" dirty="0">
+                <a:latin typeface="+mn-lt"/>
+              </a:rPr>
+              <a:t>loan attributes </a:t>
+            </a:r>
+            <a:r>
+              <a:rPr lang="en-CA" sz="2300" dirty="0">
+                <a:latin typeface="+mn-lt"/>
+              </a:rPr>
+              <a:t>influence the tendency of default.</a:t>
+            </a:r>
+          </a:p>
+          <a:p>
+            <a:pPr marL="0" indent="0">
+              <a:buNone/>
+            </a:pPr>
+            <a:r>
+              <a:rPr lang="en-CA" sz="2300" dirty="0">
+                <a:latin typeface="+mn-lt"/>
+              </a:rPr>
+              <a:t>6. When a person applies for a loan,</a:t>
+            </a:r>
+            <a:r>
+              <a:rPr lang="en-CA" sz="2300" b="1" dirty="0">
+                <a:latin typeface="+mn-lt"/>
+              </a:rPr>
+              <a:t> </a:t>
+            </a:r>
+            <a:r>
+              <a:rPr lang="en-CA" sz="2300" dirty="0">
+                <a:latin typeface="+mn-lt"/>
+              </a:rPr>
+              <a:t>there are</a:t>
+            </a:r>
+            <a:r>
+              <a:rPr lang="en-CA" sz="2300" b="1" dirty="0">
+                <a:latin typeface="+mn-lt"/>
+              </a:rPr>
+              <a:t> two types of decisions</a:t>
+            </a:r>
+            <a:r>
+              <a:rPr lang="en-CA" sz="2300" dirty="0">
+                <a:latin typeface="+mn-lt"/>
+              </a:rPr>
+              <a:t> that could be taken by the company:</a:t>
+            </a:r>
+          </a:p>
+          <a:p>
+            <a:r>
+              <a:rPr lang="en-CA" sz="2300" b="1" dirty="0">
+                <a:latin typeface="+mn-lt"/>
+              </a:rPr>
+              <a:t>Loan accepted:</a:t>
+            </a:r>
+            <a:r>
+              <a:rPr lang="en-CA" sz="2300" dirty="0">
+                <a:latin typeface="+mn-lt"/>
+              </a:rPr>
+              <a:t> If the company approves the loan, there are 3 possible scenarios described below:</a:t>
+            </a:r>
+          </a:p>
+          <a:p>
+            <a:pPr lvl="1"/>
+            <a:r>
+              <a:rPr lang="en-CA" sz="2300" b="1" dirty="0">
+                <a:latin typeface="+mn-lt"/>
+              </a:rPr>
+              <a:t>Fully paid</a:t>
+            </a:r>
+            <a:r>
+              <a:rPr lang="en-CA" sz="2300" dirty="0">
+                <a:latin typeface="+mn-lt"/>
+              </a:rPr>
+              <a:t>: Applicant has fully paid the loan (the principal and the interest rate)</a:t>
+            </a:r>
+          </a:p>
+          <a:p>
+            <a:pPr lvl="1"/>
+            <a:r>
+              <a:rPr lang="en-CA" sz="2300" b="1" dirty="0">
+                <a:latin typeface="+mn-lt"/>
+              </a:rPr>
+              <a:t>Current</a:t>
+            </a:r>
+            <a:r>
+              <a:rPr lang="en-CA" sz="2300" dirty="0">
+                <a:latin typeface="+mn-lt"/>
+              </a:rPr>
+              <a:t>: Applicant is in the process of paying the instalments, i.e. the tenure of the loan is not yet completed. These candidates are not labelled as 'defaulted'.</a:t>
+            </a:r>
+          </a:p>
+          <a:p>
+            <a:pPr lvl="1"/>
+            <a:r>
+              <a:rPr lang="en-CA" sz="2300" b="1" dirty="0">
+                <a:latin typeface="+mn-lt"/>
+              </a:rPr>
+              <a:t>Charged-off</a:t>
+            </a:r>
+            <a:r>
+              <a:rPr lang="en-CA" sz="2300" dirty="0">
+                <a:latin typeface="+mn-lt"/>
+              </a:rPr>
+              <a:t>: Applicant has not paid the instalments in due time for a long period of time, i.e. he/she has </a:t>
+            </a:r>
+            <a:r>
+              <a:rPr lang="en-CA" sz="2300" b="1" dirty="0">
+                <a:latin typeface="+mn-lt"/>
+              </a:rPr>
+              <a:t>defaulted </a:t>
+            </a:r>
+            <a:r>
+              <a:rPr lang="en-CA" sz="2300" dirty="0">
+                <a:latin typeface="+mn-lt"/>
+              </a:rPr>
+              <a:t>on the loan </a:t>
+            </a:r>
+          </a:p>
+          <a:p>
+            <a:r>
+              <a:rPr lang="en-CA" sz="2300" b="1" dirty="0">
+                <a:latin typeface="+mn-lt"/>
+              </a:rPr>
+              <a:t>Loan rejected</a:t>
+            </a:r>
+            <a:r>
+              <a:rPr lang="en-CA" sz="2300" dirty="0">
+                <a:latin typeface="+mn-lt"/>
+              </a:rPr>
+              <a:t>: The company had rejected the loan (because the candidate does not meet their requirements etc.). Since the loan was rejected, there is no transactional history of those applicants with the company and so this data is not available with the company (and thus in this dataset)</a:t>
+            </a:r>
+          </a:p>
+          <a:p>
+            <a:pPr marL="342900" indent="-342900">
+              <a:buAutoNum type="arabicPeriod"/>
+            </a:pPr>
+            <a:endParaRPr lang="en-CA" sz="1800" dirty="0">
+              <a:latin typeface="+mn-lt"/>
+            </a:endParaRPr>
+          </a:p>
+          <a:p>
+            <a:pPr marL="342900" indent="-342900">
+              <a:buAutoNum type="arabicPeriod"/>
+            </a:pPr>
+            <a:endParaRPr lang="en-IN" sz="1800" dirty="0">
+              <a:latin typeface="+mn-lt"/>
+            </a:endParaRPr>
           </a:p>
           <a:p>
             <a:pPr marL="342900" indent="-342900">
@@ -3833,12 +4136,12 @@
           <a:lstStyle/>
           <a:p>
             <a:r>
-              <a:rPr lang="en-IN" b="1" dirty="0"/>
+              <a:rPr lang="en-IN" sz="2800" b="1" dirty="0"/>
               <a:t> </a:t>
             </a:r>
             <a:r>
               <a:rPr lang="en-IN" sz="2800" dirty="0"/>
-              <a:t>&lt;Abstract&gt;</a:t>
+              <a:t>Problem Statement</a:t>
             </a:r>
           </a:p>
         </p:txBody>
@@ -3875,12 +4178,18 @@
       </p:grpSpPr>
       <p:sp>
         <p:nvSpPr>
-          <p:cNvPr id="3" name="Content Placeholder 2"/>
-          <p:cNvSpPr>
-            <a:spLocks noGrp="1"/>
-          </p:cNvSpPr>
-          <p:nvPr>
-            <p:ph idx="1"/>
+          <p:cNvPr id="2" name="Title 1">
+            <a:extLst>
+              <a:ext uri="{FF2B5EF4-FFF2-40B4-BE49-F238E27FC236}">
+                <a16:creationId xmlns:a16="http://schemas.microsoft.com/office/drawing/2014/main" id="{F1280CA6-F03E-8E4E-9507-6C9D1ACD3368}"/>
+              </a:ext>
+            </a:extLst>
+          </p:cNvPr>
+          <p:cNvSpPr>
+            <a:spLocks noGrp="1"/>
+          </p:cNvSpPr>
+          <p:nvPr>
+            <p:ph type="title"/>
           </p:nvPr>
         </p:nvSpPr>
         <p:spPr/>
@@ -3890,168 +4199,80 @@
           </a:bodyPr>
           <a:lstStyle/>
           <a:p>
-            <a:pPr marL="342900" indent="-342900">
-              <a:buAutoNum type="arabicPeriod"/>
-            </a:pPr>
-            <a:r>
-              <a:rPr lang="en-IN" sz="1600" dirty="0"/>
-              <a:t>Understand the data and document the metadata</a:t>
-            </a:r>
-          </a:p>
-          <a:p>
-            <a:pPr marL="342900" indent="-342900">
-              <a:buAutoNum type="arabicPeriod"/>
-            </a:pPr>
-            <a:r>
-              <a:rPr lang="en-IN" sz="1600" dirty="0"/>
-              <a:t>Filter dataset to have only charged off records and the top 10 relevant fields in the dataset for analysis. </a:t>
-            </a:r>
-          </a:p>
-          <a:p>
-            <a:pPr marL="800100" lvl="1" indent="-342900">
-              <a:buAutoNum type="arabicPeriod"/>
-            </a:pPr>
-            <a:r>
-              <a:rPr lang="en-IN" sz="1600" dirty="0"/>
-              <a:t>Perform </a:t>
-            </a:r>
-            <a:r>
-              <a:rPr lang="en-IN" sz="1600" dirty="0" err="1"/>
-              <a:t>Univarate</a:t>
-            </a:r>
-            <a:r>
-              <a:rPr lang="en-IN" sz="1600" dirty="0"/>
-              <a:t>/Bivariate analyse to identify most relevant columns</a:t>
-            </a:r>
-          </a:p>
-          <a:p>
-            <a:pPr marL="800100" lvl="1" indent="-342900">
-              <a:buAutoNum type="arabicPeriod"/>
-            </a:pPr>
-            <a:r>
-              <a:rPr lang="en-IN" sz="1600" dirty="0"/>
-              <a:t>Gather Domain Knowledge to identify top 5 or 10 relevant columns</a:t>
-            </a:r>
-          </a:p>
-          <a:p>
-            <a:pPr marL="342900" indent="-342900">
-              <a:buAutoNum type="arabicPeriod"/>
-            </a:pPr>
-            <a:r>
-              <a:rPr lang="en-IN" sz="1600" dirty="0"/>
-              <a:t>Document the assumptions</a:t>
-            </a:r>
-          </a:p>
-          <a:p>
-            <a:pPr marL="342900" indent="-342900">
-              <a:buAutoNum type="arabicPeriod"/>
-            </a:pPr>
-            <a:r>
-              <a:rPr lang="en-IN" sz="1600" dirty="0"/>
-              <a:t>Identify derived metrics and create them.</a:t>
-            </a:r>
-          </a:p>
-          <a:p>
-            <a:pPr marL="342900" indent="-342900">
-              <a:buAutoNum type="arabicPeriod"/>
-            </a:pPr>
-            <a:r>
-              <a:rPr lang="en-IN" sz="1600" dirty="0"/>
-              <a:t>Do Data Cleaning &amp; Manipulation as required</a:t>
-            </a:r>
-          </a:p>
-          <a:p>
-            <a:pPr marL="342900" indent="-342900">
-              <a:buFont typeface="Arial" panose="020B0604020202020204" pitchFamily="34" charset="0"/>
-              <a:buAutoNum type="arabicPeriod"/>
-            </a:pPr>
-            <a:r>
-              <a:rPr lang="en-IN" sz="1600" dirty="0"/>
-              <a:t>Identify the questions to be answered by the analysis.</a:t>
-            </a:r>
-          </a:p>
-          <a:p>
-            <a:pPr marL="342900" indent="-342900">
-              <a:buAutoNum type="arabicPeriod"/>
-            </a:pPr>
-            <a:r>
-              <a:rPr lang="en-IN" sz="1600" dirty="0"/>
-              <a:t>Perform univariate analysis and segmented univariate analysis and understand each of the relevant variable and plot graphs, to answer the above identified questions.</a:t>
-            </a:r>
-          </a:p>
-          <a:p>
-            <a:pPr marL="342900" indent="-342900">
-              <a:buAutoNum type="arabicPeriod"/>
-            </a:pPr>
-            <a:r>
-              <a:rPr lang="en-IN" sz="1600" dirty="0"/>
-              <a:t>Perform Bivariate analysis and plot correlation matrix or heatmap.</a:t>
-            </a:r>
-          </a:p>
-          <a:p>
-            <a:pPr marL="342900" indent="-342900">
-              <a:buAutoNum type="arabicPeriod"/>
-            </a:pPr>
-            <a:r>
-              <a:rPr lang="en-IN" sz="1600" dirty="0"/>
-              <a:t>Conclude the analysis by documenting the observations.</a:t>
-            </a:r>
-          </a:p>
-          <a:p>
-            <a:pPr marL="342900" indent="-342900">
-              <a:buAutoNum type="arabicPeriod"/>
-            </a:pPr>
-            <a:endParaRPr lang="en-IN" sz="1400" dirty="0"/>
-          </a:p>
-          <a:p>
-            <a:pPr marL="342900" indent="-342900">
-              <a:buAutoNum type="arabicPeriod"/>
-            </a:pPr>
-            <a:endParaRPr lang="en-IN" sz="1400" dirty="0"/>
-          </a:p>
-        </p:txBody>
-      </p:sp>
-      <p:sp>
-        <p:nvSpPr>
-          <p:cNvPr id="5" name="Title 1"/>
-          <p:cNvSpPr>
-            <a:spLocks noGrp="1"/>
-          </p:cNvSpPr>
-          <p:nvPr>
-            <p:ph type="title"/>
-          </p:nvPr>
-        </p:nvSpPr>
+            <a:r>
+              <a:rPr lang="en-US" sz="2800" dirty="0"/>
+              <a:t>Problem Statement</a:t>
+            </a:r>
+          </a:p>
+        </p:txBody>
+      </p:sp>
+      <p:sp>
+        <p:nvSpPr>
+          <p:cNvPr id="3" name="Content Placeholder 2">
+            <a:extLst>
+              <a:ext uri="{FF2B5EF4-FFF2-40B4-BE49-F238E27FC236}">
+                <a16:creationId xmlns:a16="http://schemas.microsoft.com/office/drawing/2014/main" id="{4F465EC4-740C-6C40-8129-E1352176EB02}"/>
+              </a:ext>
+            </a:extLst>
+          </p:cNvPr>
+          <p:cNvSpPr>
+            <a:spLocks noGrp="1"/>
+          </p:cNvSpPr>
+          <p:nvPr>
+            <p:ph idx="1"/>
+          </p:nvPr>
+        </p:nvSpPr>
+        <p:spPr/>
+        <p:txBody>
+          <a:bodyPr/>
+          <a:lstStyle/>
+          <a:p>
+            <a:r>
+              <a:rPr lang="en-US" sz="1800" dirty="0">
+                <a:latin typeface="+mn-lt"/>
+              </a:rPr>
+              <a:t>Pictorial representation of leading to a decision</a:t>
+            </a:r>
+          </a:p>
+          <a:p>
+            <a:endParaRPr lang="en-US" dirty="0"/>
+          </a:p>
+        </p:txBody>
+      </p:sp>
+      <p:pic>
+        <p:nvPicPr>
+          <p:cNvPr id="4" name="Picture 3">
+            <a:extLst>
+              <a:ext uri="{FF2B5EF4-FFF2-40B4-BE49-F238E27FC236}">
+                <a16:creationId xmlns:a16="http://schemas.microsoft.com/office/drawing/2014/main" id="{753FD49C-C4E3-CB4B-A6AF-CBF35653A473}"/>
+              </a:ext>
+            </a:extLst>
+          </p:cNvPr>
+          <p:cNvPicPr>
+            <a:picLocks noChangeAspect="1"/>
+          </p:cNvPicPr>
+          <p:nvPr/>
+        </p:nvPicPr>
+        <p:blipFill>
+          <a:blip r:embed="rId2"/>
+          <a:stretch>
+            <a:fillRect/>
+          </a:stretch>
+        </p:blipFill>
         <p:spPr>
           <a:xfrm>
-            <a:off x="1136469" y="640080"/>
-            <a:ext cx="9313817" cy="856138"/>
+            <a:off x="776201" y="2428903"/>
+            <a:ext cx="7240188" cy="3770284"/>
           </a:xfrm>
+          <a:prstGeom prst="rect">
+            <a:avLst/>
+          </a:prstGeom>
         </p:spPr>
-        <p:txBody>
-          <a:bodyPr>
-            <a:normAutofit fontScale="90000"/>
-          </a:bodyPr>
-          <a:lstStyle/>
-          <a:p>
-            <a:r>
-              <a:rPr lang="en-IN" b="1" dirty="0"/>
-              <a:t> </a:t>
-            </a:r>
-            <a:r>
-              <a:rPr lang="en-IN" sz="2800" dirty="0"/>
-              <a:t>Flow of Analysis:</a:t>
-            </a:r>
-            <a:br>
-              <a:rPr lang="en-IN" sz="2800" dirty="0"/>
-            </a:br>
-            <a:endParaRPr lang="en-IN" sz="2800" dirty="0"/>
-          </a:p>
-        </p:txBody>
-      </p:sp>
+      </p:pic>
     </p:spTree>
     <p:extLst>
       <p:ext uri="{BB962C8B-B14F-4D97-AF65-F5344CB8AC3E}">
-        <p14:creationId xmlns:p14="http://schemas.microsoft.com/office/powerpoint/2010/main" val="1321292178"/>
+        <p14:creationId xmlns:p14="http://schemas.microsoft.com/office/powerpoint/2010/main" val="2592647718"/>
       </p:ext>
     </p:extLst>
   </p:cSld>
@@ -4095,13 +4316,138 @@
           </a:bodyPr>
           <a:lstStyle/>
           <a:p>
-            <a:pPr marL="0" indent="0">
-              <a:buNone/>
+            <a:pPr marL="342900" indent="-342900">
+              <a:buAutoNum type="arabicPeriod"/>
             </a:pPr>
             <a:r>
-              <a:rPr lang="en-IN" sz="1800" dirty="0"/>
-              <a:t>Use flow chart</a:t>
-            </a:r>
+              <a:rPr lang="en-IN" sz="1800" dirty="0">
+                <a:latin typeface="+mn-lt"/>
+              </a:rPr>
+              <a:t>Understand the data and document the metadata</a:t>
+            </a:r>
+          </a:p>
+          <a:p>
+            <a:pPr marL="342900" indent="-342900">
+              <a:buAutoNum type="arabicPeriod"/>
+            </a:pPr>
+            <a:r>
+              <a:rPr lang="en-IN" sz="1800" dirty="0">
+                <a:latin typeface="+mn-lt"/>
+              </a:rPr>
+              <a:t>Filter dataset to have only charged off records and the top 10 relevant fields in the dataset for analysis. </a:t>
+            </a:r>
+          </a:p>
+          <a:p>
+            <a:pPr marL="800100" lvl="1" indent="-342900">
+              <a:buAutoNum type="arabicPeriod"/>
+            </a:pPr>
+            <a:r>
+              <a:rPr lang="en-IN" sz="1800" dirty="0">
+                <a:latin typeface="+mn-lt"/>
+              </a:rPr>
+              <a:t>Perform Univariate /Bivariate analyse to identify most relevant columns</a:t>
+            </a:r>
+          </a:p>
+          <a:p>
+            <a:pPr marL="800100" lvl="1" indent="-342900">
+              <a:buAutoNum type="arabicPeriod"/>
+            </a:pPr>
+            <a:r>
+              <a:rPr lang="en-IN" sz="1800" dirty="0">
+                <a:latin typeface="+mn-lt"/>
+              </a:rPr>
+              <a:t>Gather Domain Knowledge to identify top 5 or 10 relevant columns</a:t>
+            </a:r>
+          </a:p>
+          <a:p>
+            <a:pPr marL="342900" indent="-342900">
+              <a:buAutoNum type="arabicPeriod"/>
+            </a:pPr>
+            <a:r>
+              <a:rPr lang="en-IN" sz="1800" dirty="0">
+                <a:latin typeface="+mn-lt"/>
+              </a:rPr>
+              <a:t>Document the assumptions</a:t>
+            </a:r>
+          </a:p>
+          <a:p>
+            <a:pPr marL="342900" indent="-342900">
+              <a:buAutoNum type="arabicPeriod"/>
+            </a:pPr>
+            <a:r>
+              <a:rPr lang="en-IN" sz="1800" dirty="0">
+                <a:latin typeface="+mn-lt"/>
+              </a:rPr>
+              <a:t>Identify derived metrics and create them.</a:t>
+            </a:r>
+          </a:p>
+          <a:p>
+            <a:pPr marL="342900" indent="-342900">
+              <a:buAutoNum type="arabicPeriod"/>
+            </a:pPr>
+            <a:r>
+              <a:rPr lang="en-IN" sz="1800" dirty="0">
+                <a:latin typeface="+mn-lt"/>
+              </a:rPr>
+              <a:t>Do Data Cleaning &amp; Manipulation as required</a:t>
+            </a:r>
+          </a:p>
+          <a:p>
+            <a:pPr marL="342900" indent="-342900">
+              <a:buFont typeface="Arial" panose="020B0604020202020204" pitchFamily="34" charset="0"/>
+              <a:buAutoNum type="arabicPeriod"/>
+            </a:pPr>
+            <a:r>
+              <a:rPr lang="en-IN" sz="1800" dirty="0">
+                <a:latin typeface="+mn-lt"/>
+              </a:rPr>
+              <a:t>Identify the questions to be answered by the analysis.</a:t>
+            </a:r>
+          </a:p>
+          <a:p>
+            <a:pPr marL="342900" indent="-342900">
+              <a:buAutoNum type="arabicPeriod"/>
+            </a:pPr>
+            <a:r>
+              <a:rPr lang="en-IN" sz="1800" dirty="0">
+                <a:latin typeface="+mn-lt"/>
+              </a:rPr>
+              <a:t>Perform univariate analysis and segmented univariate analysis and understand each of the relevant variable and plot graphs, to answer the above identified questions.</a:t>
+            </a:r>
+          </a:p>
+          <a:p>
+            <a:pPr marL="342900" indent="-342900">
+              <a:buAutoNum type="arabicPeriod"/>
+            </a:pPr>
+            <a:r>
+              <a:rPr lang="en-IN" sz="1800" dirty="0">
+                <a:latin typeface="+mn-lt"/>
+              </a:rPr>
+              <a:t>Perform Bivariate analysis and plot correlation matrix or heatmap.</a:t>
+            </a:r>
+          </a:p>
+          <a:p>
+            <a:pPr marL="342900" indent="-342900">
+              <a:buAutoNum type="arabicPeriod"/>
+            </a:pPr>
+            <a:r>
+              <a:rPr lang="en-IN" sz="1800" dirty="0">
+                <a:latin typeface="+mn-lt"/>
+              </a:rPr>
+              <a:t>Conclude the analysis by documenting the observations.</a:t>
+            </a:r>
+          </a:p>
+          <a:p>
+            <a:pPr marL="342900" indent="-342900">
+              <a:buAutoNum type="arabicPeriod"/>
+            </a:pPr>
+            <a:endParaRPr lang="en-IN" sz="1400" dirty="0"/>
+          </a:p>
+          <a:p>
+            <a:pPr marL="342900" indent="-342900">
+              <a:buAutoNum type="arabicPeriod"/>
+            </a:pPr>
+            <a:endParaRPr lang="en-IN" sz="1400" dirty="0"/>
           </a:p>
         </p:txBody>
       </p:sp>
@@ -4122,7 +4468,9 @@
           </a:xfrm>
         </p:spPr>
         <p:txBody>
-          <a:bodyPr/>
+          <a:bodyPr>
+            <a:normAutofit fontScale="90000"/>
+          </a:bodyPr>
           <a:lstStyle/>
           <a:p>
             <a:r>
@@ -4130,16 +4478,20 @@
               <a:t> </a:t>
             </a:r>
             <a:r>
+              <a:rPr lang="en-IN" sz="3100" dirty="0"/>
+              <a:t>Flow of Analysis:</a:t>
+            </a:r>
+            <a:br>
               <a:rPr lang="en-IN" sz="2800" dirty="0"/>
-              <a:t>&lt;Problem solving methodology&gt;</a:t>
-            </a:r>
+            </a:br>
+            <a:endParaRPr lang="en-IN" sz="2800" dirty="0"/>
           </a:p>
         </p:txBody>
       </p:sp>
     </p:spTree>
     <p:extLst>
       <p:ext uri="{BB962C8B-B14F-4D97-AF65-F5344CB8AC3E}">
-        <p14:creationId xmlns:p14="http://schemas.microsoft.com/office/powerpoint/2010/main" val="2118598445"/>
+        <p14:creationId xmlns:p14="http://schemas.microsoft.com/office/powerpoint/2010/main" val="1321292178"/>
       </p:ext>
     </p:extLst>
   </p:cSld>
@@ -4168,7 +4520,34 @@
       </p:grpSpPr>
       <p:sp>
         <p:nvSpPr>
-          <p:cNvPr id="2" name="Title 1"/>
+          <p:cNvPr id="3" name="Content Placeholder 2"/>
+          <p:cNvSpPr>
+            <a:spLocks noGrp="1"/>
+          </p:cNvSpPr>
+          <p:nvPr>
+            <p:ph idx="1"/>
+          </p:nvPr>
+        </p:nvSpPr>
+        <p:spPr/>
+        <p:txBody>
+          <a:bodyPr>
+            <a:normAutofit/>
+          </a:bodyPr>
+          <a:lstStyle/>
+          <a:p>
+            <a:pPr marL="0" indent="0">
+              <a:buNone/>
+            </a:pPr>
+            <a:r>
+              <a:rPr lang="en-IN" sz="1800" dirty="0"/>
+              <a:t>Use flow chart</a:t>
+            </a:r>
+          </a:p>
+        </p:txBody>
+      </p:sp>
+      <p:sp>
+        <p:nvSpPr>
+          <p:cNvPr id="5" name="Title 1"/>
           <p:cNvSpPr>
             <a:spLocks noGrp="1"/>
           </p:cNvSpPr>
@@ -4176,7 +4555,12 @@
             <p:ph type="title"/>
           </p:nvPr>
         </p:nvSpPr>
-        <p:spPr/>
+        <p:spPr>
+          <a:xfrm>
+            <a:off x="1136469" y="640080"/>
+            <a:ext cx="9313817" cy="856138"/>
+          </a:xfrm>
+        </p:spPr>
         <p:txBody>
           <a:bodyPr/>
           <a:lstStyle/>
@@ -4187,178 +4571,15 @@
             </a:r>
             <a:r>
               <a:rPr lang="en-IN" sz="2800" dirty="0"/>
-              <a:t>&lt;Analysis&gt;</a:t>
-            </a:r>
-          </a:p>
-        </p:txBody>
-      </p:sp>
-      <p:sp>
-        <p:nvSpPr>
-          <p:cNvPr id="3" name="Content Placeholder 2"/>
-          <p:cNvSpPr>
-            <a:spLocks noGrp="1"/>
-          </p:cNvSpPr>
-          <p:nvPr>
-            <p:ph idx="1"/>
-          </p:nvPr>
-        </p:nvSpPr>
-        <p:spPr/>
-        <p:txBody>
-          <a:bodyPr>
-            <a:normAutofit fontScale="77500" lnSpcReduction="20000"/>
-          </a:bodyPr>
-          <a:lstStyle/>
-          <a:p>
-            <a:pPr marL="914400" lvl="2" indent="0">
-              <a:buNone/>
-            </a:pPr>
-            <a:r>
-              <a:rPr lang="en-IN" dirty="0"/>
-              <a:t>Top 5 factors are:</a:t>
-            </a:r>
-          </a:p>
-          <a:p>
-            <a:pPr marL="1257300" lvl="2" indent="-342900">
-              <a:buAutoNum type="arabicPeriod"/>
-            </a:pPr>
-            <a:r>
-              <a:rPr lang="en-IN" dirty="0"/>
-              <a:t>Payment History</a:t>
-            </a:r>
-          </a:p>
-          <a:p>
-            <a:pPr marL="1257300" lvl="2" indent="-342900">
-              <a:buAutoNum type="arabicPeriod"/>
-            </a:pPr>
-            <a:r>
-              <a:rPr lang="en-IN" dirty="0"/>
-              <a:t>Credit Utilization</a:t>
-            </a:r>
-          </a:p>
-          <a:p>
-            <a:pPr marL="1257300" lvl="2" indent="-342900">
-              <a:buAutoNum type="arabicPeriod"/>
-            </a:pPr>
-            <a:r>
-              <a:rPr lang="en-IN" dirty="0"/>
-              <a:t>Length of Credit History</a:t>
-            </a:r>
-          </a:p>
-          <a:p>
-            <a:pPr marL="1257300" lvl="2" indent="-342900">
-              <a:buAutoNum type="arabicPeriod"/>
-            </a:pPr>
-            <a:r>
-              <a:rPr lang="en-IN" dirty="0"/>
-              <a:t>New Credit</a:t>
-            </a:r>
-          </a:p>
-          <a:p>
-            <a:pPr marL="1257300" lvl="2" indent="-342900">
-              <a:buAutoNum type="arabicPeriod"/>
-            </a:pPr>
-            <a:r>
-              <a:rPr lang="en-IN" dirty="0"/>
-              <a:t>Credit Mix</a:t>
-            </a:r>
-          </a:p>
-          <a:p>
-            <a:pPr marL="914400" lvl="2" indent="0">
-              <a:buNone/>
-            </a:pPr>
-            <a:endParaRPr lang="en-IN" dirty="0"/>
-          </a:p>
-          <a:p>
-            <a:pPr marL="914400" lvl="2" indent="0">
-              <a:buNone/>
-            </a:pPr>
-            <a:r>
-              <a:rPr lang="en-IN" dirty="0"/>
-              <a:t>Derived Metrics:</a:t>
-            </a:r>
-          </a:p>
-          <a:p>
-            <a:pPr marL="914400" lvl="2" indent="0">
-              <a:buNone/>
-            </a:pPr>
-            <a:r>
-              <a:rPr lang="en-IN" dirty="0"/>
-              <a:t>1. Credit Utilization should be binned to buckets like 10</a:t>
-            </a:r>
-          </a:p>
-          <a:p>
-            <a:pPr marL="914400" lvl="2" indent="0">
-              <a:buNone/>
-            </a:pPr>
-            <a:r>
-              <a:rPr lang="en-IN" dirty="0"/>
-              <a:t>2.</a:t>
-            </a:r>
-          </a:p>
-          <a:p>
-            <a:pPr marL="0" indent="0">
-              <a:buNone/>
-            </a:pPr>
-            <a:endParaRPr lang="en-IN" sz="1400" dirty="0"/>
-          </a:p>
-          <a:p>
-            <a:pPr marL="0" indent="0">
-              <a:buNone/>
-            </a:pPr>
-            <a:endParaRPr lang="en-IN" sz="1400" dirty="0"/>
-          </a:p>
-          <a:p>
-            <a:pPr marL="0" indent="0">
-              <a:buNone/>
-            </a:pPr>
-            <a:endParaRPr lang="en-IN" sz="1400" dirty="0"/>
-          </a:p>
-          <a:p>
-            <a:pPr marL="0" indent="0">
-              <a:buNone/>
-            </a:pPr>
-            <a:endParaRPr lang="en-IN" sz="1400" dirty="0"/>
-          </a:p>
-          <a:p>
-            <a:pPr marL="0" indent="0">
-              <a:buNone/>
-            </a:pPr>
-            <a:endParaRPr lang="en-IN" sz="1400" dirty="0"/>
-          </a:p>
-          <a:p>
-            <a:pPr marL="0" indent="0">
-              <a:buNone/>
-            </a:pPr>
-            <a:endParaRPr lang="en-IN" sz="1400" dirty="0"/>
-          </a:p>
-          <a:p>
-            <a:pPr marL="0" indent="0">
-              <a:buNone/>
-            </a:pPr>
-            <a:endParaRPr lang="en-IN" sz="1400" dirty="0"/>
-          </a:p>
-          <a:p>
-            <a:pPr marL="0" indent="0">
-              <a:buNone/>
-            </a:pPr>
-            <a:r>
-              <a:rPr lang="en-IN" sz="1400" dirty="0"/>
-              <a:t>Reference: </a:t>
-            </a:r>
-            <a:r>
-              <a:rPr lang="en-IN" sz="1400" dirty="0">
-                <a:hlinkClick r:id="rId2"/>
-              </a:rPr>
-              <a:t>https://www.creditcards.com/credit-card-news/help/5-parts-components-fico-credit-score-6000.php</a:t>
-            </a:r>
-            <a:endParaRPr lang="en-IN" sz="1400" dirty="0"/>
+              <a:t>&lt;Problem solving methodology&gt;</a:t>
+            </a:r>
           </a:p>
         </p:txBody>
       </p:sp>
     </p:spTree>
     <p:extLst>
       <p:ext uri="{BB962C8B-B14F-4D97-AF65-F5344CB8AC3E}">
-        <p14:creationId xmlns:p14="http://schemas.microsoft.com/office/powerpoint/2010/main" val="3095347154"/>
+        <p14:creationId xmlns:p14="http://schemas.microsoft.com/office/powerpoint/2010/main" val="2118598445"/>
       </p:ext>
     </p:extLst>
   </p:cSld>
@@ -4424,24 +4645,160 @@
         <p:spPr/>
         <p:txBody>
           <a:bodyPr>
-            <a:normAutofit/>
+            <a:normAutofit fontScale="77500" lnSpcReduction="20000"/>
           </a:bodyPr>
           <a:lstStyle/>
           <a:p>
+            <a:pPr marL="914400" lvl="2" indent="0">
+              <a:buNone/>
+            </a:pPr>
+            <a:r>
+              <a:rPr lang="en-IN" dirty="0"/>
+              <a:t>Top 5 factors are:</a:t>
+            </a:r>
+          </a:p>
+          <a:p>
+            <a:pPr marL="1257300" lvl="2" indent="-342900">
+              <a:buAutoNum type="arabicPeriod"/>
+            </a:pPr>
+            <a:r>
+              <a:rPr lang="en-IN" dirty="0"/>
+              <a:t>Payment History</a:t>
+            </a:r>
+          </a:p>
+          <a:p>
+            <a:pPr marL="1257300" lvl="2" indent="-342900">
+              <a:buAutoNum type="arabicPeriod"/>
+            </a:pPr>
+            <a:r>
+              <a:rPr lang="en-IN" dirty="0"/>
+              <a:t>Credit Utilization</a:t>
+            </a:r>
+          </a:p>
+          <a:p>
+            <a:pPr marL="1257300" lvl="2" indent="-342900">
+              <a:buAutoNum type="arabicPeriod"/>
+            </a:pPr>
+            <a:r>
+              <a:rPr lang="en-IN" dirty="0"/>
+              <a:t>Length of Credit History</a:t>
+            </a:r>
+          </a:p>
+          <a:p>
+            <a:pPr marL="1257300" lvl="2" indent="-342900">
+              <a:buAutoNum type="arabicPeriod"/>
+            </a:pPr>
+            <a:r>
+              <a:rPr lang="en-IN" dirty="0"/>
+              <a:t>New Credit</a:t>
+            </a:r>
+          </a:p>
+          <a:p>
+            <a:pPr marL="1257300" lvl="2" indent="-342900">
+              <a:buAutoNum type="arabicPeriod"/>
+            </a:pPr>
+            <a:r>
+              <a:rPr lang="en-IN" dirty="0"/>
+              <a:t>Credit Mix</a:t>
+            </a:r>
+          </a:p>
+          <a:p>
+            <a:pPr marL="914400" lvl="2" indent="0">
+              <a:buNone/>
+            </a:pPr>
+            <a:endParaRPr lang="en-IN" dirty="0"/>
+          </a:p>
+          <a:p>
+            <a:pPr marL="914400" lvl="2" indent="0">
+              <a:buNone/>
+            </a:pPr>
+            <a:r>
+              <a:rPr lang="en-IN" dirty="0"/>
+              <a:t>Derived Metrics:</a:t>
+            </a:r>
+          </a:p>
+          <a:p>
+            <a:pPr marL="914400" lvl="2" indent="0">
+              <a:buNone/>
+            </a:pPr>
+            <a:r>
+              <a:rPr lang="en-IN" dirty="0"/>
+              <a:t>1. Credit Utilization should be binned to buckets like 10</a:t>
+            </a:r>
+          </a:p>
+          <a:p>
+            <a:pPr marL="914400" lvl="2" indent="0">
+              <a:buNone/>
+            </a:pPr>
+            <a:r>
+              <a:rPr lang="en-IN" dirty="0"/>
+              <a:t>2.</a:t>
+            </a:r>
+          </a:p>
+          <a:p>
             <a:pPr marL="0" indent="0">
               <a:buNone/>
             </a:pPr>
+            <a:endParaRPr lang="en-IN" sz="1400" dirty="0"/>
+          </a:p>
+          <a:p>
+            <a:pPr marL="0" indent="0">
+              <a:buNone/>
+            </a:pPr>
+            <a:endParaRPr lang="en-IN" sz="1400" dirty="0"/>
+          </a:p>
+          <a:p>
+            <a:pPr marL="0" indent="0">
+              <a:buNone/>
+            </a:pPr>
+            <a:endParaRPr lang="en-IN" sz="1400" dirty="0"/>
+          </a:p>
+          <a:p>
+            <a:pPr marL="0" indent="0">
+              <a:buNone/>
+            </a:pPr>
+            <a:endParaRPr lang="en-IN" sz="1400" dirty="0"/>
+          </a:p>
+          <a:p>
+            <a:pPr marL="0" indent="0">
+              <a:buNone/>
+            </a:pPr>
+            <a:endParaRPr lang="en-IN" sz="1400" dirty="0"/>
+          </a:p>
+          <a:p>
+            <a:pPr marL="0" indent="0">
+              <a:buNone/>
+            </a:pPr>
+            <a:endParaRPr lang="en-IN" sz="1400" dirty="0"/>
+          </a:p>
+          <a:p>
+            <a:pPr marL="0" indent="0">
+              <a:buNone/>
+            </a:pPr>
+            <a:endParaRPr lang="en-IN" sz="1400" dirty="0"/>
+          </a:p>
+          <a:p>
+            <a:pPr marL="0" indent="0">
+              <a:buNone/>
+            </a:pPr>
             <a:r>
               <a:rPr lang="en-IN" sz="1400" dirty="0"/>
-              <a:t>Assumptions:</a:t>
-            </a:r>
+              <a:t>Reference: </a:t>
+            </a:r>
+            <a:r>
+              <a:rPr lang="en-IN" sz="1400" dirty="0">
+                <a:hlinkClick r:id="rId2"/>
+              </a:rPr>
+              <a:t>https://www.creditcards.com/credit-card-news/help/5-parts-components-fico-credit-score-6000.php</a:t>
+            </a:r>
+            <a:endParaRPr lang="en-IN" sz="1400" dirty="0"/>
           </a:p>
         </p:txBody>
       </p:sp>
     </p:spTree>
     <p:extLst>
       <p:ext uri="{BB962C8B-B14F-4D97-AF65-F5344CB8AC3E}">
-        <p14:creationId xmlns:p14="http://schemas.microsoft.com/office/powerpoint/2010/main" val="1302983225"/>
+        <p14:creationId xmlns:p14="http://schemas.microsoft.com/office/powerpoint/2010/main" val="3095347154"/>
       </p:ext>
     </p:extLst>
   </p:cSld>
@@ -4516,15 +4873,7 @@
             </a:pPr>
             <a:r>
               <a:rPr lang="en-IN" sz="1400" dirty="0"/>
-              <a:t>Univariate &amp; Segmented Univariate </a:t>
-            </a:r>
-            <a:r>
-              <a:rPr lang="en-IN" sz="1400" dirty="0" err="1"/>
-              <a:t>Analsysis</a:t>
-            </a:r>
-            <a:r>
-              <a:rPr lang="en-IN" sz="1400" dirty="0"/>
-              <a:t> -</a:t>
+              <a:t>Assumptions:</a:t>
             </a:r>
           </a:p>
         </p:txBody>
@@ -4532,7 +4881,7 @@
     </p:spTree>
     <p:extLst>
       <p:ext uri="{BB962C8B-B14F-4D97-AF65-F5344CB8AC3E}">
-        <p14:creationId xmlns:p14="http://schemas.microsoft.com/office/powerpoint/2010/main" val="567511567"/>
+        <p14:creationId xmlns:p14="http://schemas.microsoft.com/office/powerpoint/2010/main" val="1302983225"/>
       </p:ext>
     </p:extLst>
   </p:cSld>
@@ -4607,15 +4956,7 @@
             </a:pPr>
             <a:r>
               <a:rPr lang="en-IN" sz="1400" dirty="0"/>
-              <a:t>Bivariate </a:t>
-            </a:r>
-            <a:r>
-              <a:rPr lang="en-IN" sz="1400" dirty="0" err="1"/>
-              <a:t>Analsysis</a:t>
-            </a:r>
-            <a:r>
-              <a:rPr lang="en-IN" sz="1400" dirty="0"/>
-              <a:t> -</a:t>
+              <a:t>Univariate &amp; Segmented Univariate Analysis -</a:t>
             </a:r>
           </a:p>
         </p:txBody>
@@ -4623,7 +4964,7 @@
     </p:spTree>
     <p:extLst>
       <p:ext uri="{BB962C8B-B14F-4D97-AF65-F5344CB8AC3E}">
-        <p14:creationId xmlns:p14="http://schemas.microsoft.com/office/powerpoint/2010/main" val="1834130071"/>
+        <p14:creationId xmlns:p14="http://schemas.microsoft.com/office/powerpoint/2010/main" val="567511567"/>
       </p:ext>
     </p:extLst>
   </p:cSld>
@@ -4652,6 +4993,32 @@
       </p:grpSpPr>
       <p:sp>
         <p:nvSpPr>
+          <p:cNvPr id="2" name="Title 1"/>
+          <p:cNvSpPr>
+            <a:spLocks noGrp="1"/>
+          </p:cNvSpPr>
+          <p:nvPr>
+            <p:ph type="title"/>
+          </p:nvPr>
+        </p:nvSpPr>
+        <p:spPr/>
+        <p:txBody>
+          <a:bodyPr/>
+          <a:lstStyle/>
+          <a:p>
+            <a:r>
+              <a:rPr lang="en-IN" b="1" dirty="0"/>
+              <a:t> </a:t>
+            </a:r>
+            <a:r>
+              <a:rPr lang="en-IN" sz="2800" dirty="0"/>
+              <a:t>&lt;Analysis&gt;</a:t>
+            </a:r>
+          </a:p>
+        </p:txBody>
+      </p:sp>
+      <p:sp>
+        <p:nvSpPr>
           <p:cNvPr id="3" name="Content Placeholder 2"/>
           <p:cNvSpPr>
             <a:spLocks noGrp="1"/>
@@ -4671,39 +5038,8 @@
               <a:buNone/>
             </a:pPr>
             <a:r>
-              <a:rPr lang="en-IN" sz="1800" dirty="0"/>
-              <a:t>Plot 1 – Univariate and Segmented Univariate Analysis </a:t>
-            </a:r>
-          </a:p>
-        </p:txBody>
-      </p:sp>
-      <p:sp>
-        <p:nvSpPr>
-          <p:cNvPr id="6" name="Title 1"/>
-          <p:cNvSpPr>
-            <a:spLocks noGrp="1"/>
-          </p:cNvSpPr>
-          <p:nvPr>
-            <p:ph type="title"/>
-          </p:nvPr>
-        </p:nvSpPr>
-        <p:spPr>
-          <a:xfrm>
-            <a:off x="1136469" y="640080"/>
-            <a:ext cx="9313817" cy="856138"/>
-          </a:xfrm>
-        </p:spPr>
-        <p:txBody>
-          <a:bodyPr/>
-          <a:lstStyle/>
-          <a:p>
-            <a:r>
-              <a:rPr lang="en-IN" b="1" dirty="0"/>
-              <a:t> </a:t>
-            </a:r>
-            <a:r>
-              <a:rPr lang="en-IN" sz="2800" dirty="0"/>
-              <a:t>&lt;Results&gt;</a:t>
+              <a:rPr lang="en-IN" sz="1400" dirty="0"/>
+              <a:t>Bivariate Analysis -</a:t>
             </a:r>
           </a:p>
         </p:txBody>
@@ -4711,7 +5047,7 @@
     </p:spTree>
     <p:extLst>
       <p:ext uri="{BB962C8B-B14F-4D97-AF65-F5344CB8AC3E}">
-        <p14:creationId xmlns:p14="http://schemas.microsoft.com/office/powerpoint/2010/main" val="1739856806"/>
+        <p14:creationId xmlns:p14="http://schemas.microsoft.com/office/powerpoint/2010/main" val="1834130071"/>
       </p:ext>
     </p:extLst>
   </p:cSld>

</xml_diff>